<commit_message>
another round of improvements, new app icon, splash page
</commit_message>
<xml_diff>
--- a/design/mobile_app_mvp_priorities.pptx
+++ b/design/mobile_app_mvp_priorities.pptx
@@ -3975,15 +3975,7 @@
           <a:p>
             <a:r>
               <a:rPr lang="en-US" dirty="0" smtClean="0"/>
-              <a:t>#</a:t>
-            </a:r>
-            <a:r>
-              <a:rPr lang="en-US" dirty="0" smtClean="0"/>
-              <a:t>44 bug: alert box “echo” </a:t>
-            </a:r>
-            <a:r>
-              <a:rPr lang="en-US" dirty="0" smtClean="0"/>
-              <a:t>effect</a:t>
+              <a:t>#44 bug: alert box “echo” effect</a:t>
             </a:r>
           </a:p>
           <a:p>
@@ -4016,19 +4008,7 @@
             <a:pPr lvl="1"/>
             <a:r>
               <a:rPr lang="en-US" dirty="0" smtClean="0"/>
-              <a:t>Provide</a:t>
-            </a:r>
-            <a:r>
-              <a:rPr lang="en-US" dirty="0" smtClean="0"/>
-              <a:t> a way </a:t>
-            </a:r>
-            <a:r>
-              <a:rPr lang="en-US" dirty="0" smtClean="0"/>
-              <a:t>for user to</a:t>
-            </a:r>
-            <a:r>
-              <a:rPr lang="en-US" dirty="0" smtClean="0"/>
-              <a:t> get the </a:t>
+              <a:t>Provide a way for user to get the </a:t>
             </a:r>
             <a:r>
               <a:rPr lang="en-US" dirty="0" err="1" smtClean="0"/>
@@ -4036,21 +4016,8 @@
             </a:r>
             <a:r>
               <a:rPr lang="en-US" dirty="0" smtClean="0"/>
-              <a:t> </a:t>
-            </a:r>
-            <a:r>
-              <a:rPr lang="en-US" dirty="0" smtClean="0"/>
-              <a:t>tree</a:t>
-            </a:r>
-            <a:r>
-              <a:rPr lang="en-US" dirty="0" smtClean="0"/>
-              <a:t> (email self, </a:t>
-            </a:r>
-            <a:r>
-              <a:rPr lang="en-US" dirty="0" smtClean="0"/>
-              <a:t>tweet, send to browser)</a:t>
-            </a:r>
-            <a:endParaRPr lang="en-US" dirty="0" smtClean="0"/>
+              <a:t> tree (email self, tweet, send to browser)</a:t>
+            </a:r>
           </a:p>
         </p:txBody>
       </p:sp>
@@ -4200,11 +4167,7 @@
           <a:p>
             <a:r>
               <a:rPr lang="en-US" dirty="0" smtClean="0"/>
-              <a:t>Add help </a:t>
-            </a:r>
-            <a:r>
-              <a:rPr lang="en-US" dirty="0" smtClean="0"/>
-              <a:t>button</a:t>
+              <a:t>Add help button</a:t>
             </a:r>
           </a:p>
           <a:p>
@@ -4214,11 +4177,7 @@
             </a:pPr>
             <a:r>
               <a:rPr lang="en-US" dirty="0" smtClean="0"/>
-              <a:t> Links </a:t>
-            </a:r>
-            <a:r>
-              <a:rPr lang="en-US" dirty="0" smtClean="0"/>
-              <a:t>to ‘</a:t>
+              <a:t> Links to ‘</a:t>
             </a:r>
             <a:r>
               <a:rPr lang="en-US" dirty="0" err="1" smtClean="0"/>
@@ -4226,11 +4185,7 @@
             </a:r>
             <a:r>
               <a:rPr lang="en-US" dirty="0" smtClean="0"/>
-              <a:t>’ view</a:t>
-            </a:r>
-            <a:r>
-              <a:rPr lang="en-US" dirty="0" smtClean="0"/>
-              <a:t> </a:t>
+              <a:t>’ view </a:t>
             </a:r>
           </a:p>
           <a:p>
@@ -4240,11 +4195,7 @@
             </a:pPr>
             <a:r>
               <a:rPr lang="en-US" dirty="0" smtClean="0"/>
-              <a:t> use content </a:t>
-            </a:r>
-            <a:r>
-              <a:rPr lang="en-US" dirty="0" smtClean="0"/>
-              <a:t>from </a:t>
+              <a:t> use content from </a:t>
             </a:r>
             <a:r>
               <a:rPr lang="en-US" dirty="0" err="1" smtClean="0"/>
@@ -4309,7 +4260,7 @@
           <a:blip r:embed="rId3">
             <a:extLst>
               <a:ext uri="{28A0092B-C50C-407E-A947-70E740481C1C}">
-                <a14:useLocalDpi xmlns:a14="http://schemas.microsoft.com/office/drawing/2010/main" xmlns:p="http://schemas.openxmlformats.org/presentationml/2006/main" xmlns:r="http://schemas.openxmlformats.org/officeDocument/2006/relationships" xmlns:a="http://schemas.openxmlformats.org/drawingml/2006/main" xmlns="" val="0"/>
+                <a14:useLocalDpi xmlns="" xmlns:a="http://schemas.openxmlformats.org/drawingml/2006/main" xmlns:r="http://schemas.openxmlformats.org/officeDocument/2006/relationships" xmlns:p="http://schemas.openxmlformats.org/presentationml/2006/main" xmlns:a14="http://schemas.microsoft.com/office/drawing/2010/main" xmlns:mv="urn:schemas-microsoft-com:mac:vml" xmlns:mc="http://schemas.openxmlformats.org/markup-compatibility/2006" val="0"/>
               </a:ext>
             </a:extLst>
           </a:blip>
@@ -4339,7 +4290,7 @@
           <a:blip r:embed="rId4">
             <a:extLst>
               <a:ext uri="{28A0092B-C50C-407E-A947-70E740481C1C}">
-                <a14:useLocalDpi xmlns:a14="http://schemas.microsoft.com/office/drawing/2010/main" xmlns:p="http://schemas.openxmlformats.org/presentationml/2006/main" xmlns:r="http://schemas.openxmlformats.org/officeDocument/2006/relationships" xmlns:a="http://schemas.openxmlformats.org/drawingml/2006/main" xmlns="" val="0"/>
+                <a14:useLocalDpi xmlns="" xmlns:a="http://schemas.openxmlformats.org/drawingml/2006/main" xmlns:r="http://schemas.openxmlformats.org/officeDocument/2006/relationships" xmlns:p="http://schemas.openxmlformats.org/presentationml/2006/main" xmlns:a14="http://schemas.microsoft.com/office/drawing/2010/main" xmlns:mv="urn:schemas-microsoft-com:mac:vml" xmlns:mc="http://schemas.openxmlformats.org/markup-compatibility/2006" val="0"/>
               </a:ext>
             </a:extLst>
           </a:blip>
@@ -4420,7 +4371,7 @@
     </p:spTree>
     <p:extLst>
       <p:ext uri="{BB962C8B-B14F-4D97-AF65-F5344CB8AC3E}">
-        <p14:creationId xmlns:p14="http://schemas.microsoft.com/office/powerpoint/2010/main" xmlns:p="http://schemas.openxmlformats.org/presentationml/2006/main" xmlns:r="http://schemas.openxmlformats.org/officeDocument/2006/relationships" xmlns:a="http://schemas.openxmlformats.org/drawingml/2006/main" xmlns="" val="1864991049"/>
+        <p14:creationId xmlns="" xmlns:a="http://schemas.openxmlformats.org/drawingml/2006/main" xmlns:r="http://schemas.openxmlformats.org/officeDocument/2006/relationships" xmlns:p="http://schemas.openxmlformats.org/presentationml/2006/main" xmlns:p14="http://schemas.microsoft.com/office/powerpoint/2010/main" xmlns:mv="urn:schemas-microsoft-com:mac:vml" xmlns:mc="http://schemas.openxmlformats.org/markup-compatibility/2006" val="1864991049"/>
       </p:ext>
     </p:extLst>
   </p:cSld>
@@ -4757,19 +4708,7 @@
           <a:p>
             <a:r>
               <a:rPr lang="en-US" dirty="0" smtClean="0"/>
-              <a:t>Use logo.  Change top strip background color to grey</a:t>
-            </a:r>
-            <a:r>
-              <a:rPr lang="en-US" dirty="0" smtClean="0"/>
-              <a:t> </a:t>
-            </a:r>
-            <a:r>
-              <a:rPr lang="en-US" dirty="0" smtClean="0"/>
-              <a:t>so that logo is fully visible</a:t>
-            </a:r>
-            <a:r>
-              <a:rPr lang="en-US" dirty="0" smtClean="0"/>
-              <a:t>.  </a:t>
+              <a:t>Use logo.  Change top strip background color to grey so that logo is fully visible.  </a:t>
             </a:r>
             <a:endParaRPr lang="en-US" dirty="0"/>
           </a:p>
@@ -5223,11 +5162,7 @@
             </a:pPr>
             <a:r>
               <a:rPr lang="en-US" dirty="0" smtClean="0"/>
-              <a:t> text: “Select (or create) a list first, before trying to capture names</a:t>
-            </a:r>
-            <a:r>
-              <a:rPr lang="en-US" dirty="0" smtClean="0"/>
-              <a:t>”</a:t>
+              <a:t> text: “Select (or create) a list first, before trying to capture names”</a:t>
             </a:r>
           </a:p>
         </p:txBody>
@@ -5409,15 +5344,7 @@
           <a:p>
             <a:r>
               <a:rPr lang="en-US" dirty="0" smtClean="0"/>
-              <a:t>U</a:t>
-            </a:r>
-            <a:r>
-              <a:rPr lang="en-US" dirty="0" smtClean="0"/>
-              <a:t>se alert box to tell </a:t>
-            </a:r>
-            <a:r>
-              <a:rPr lang="en-US" dirty="0" smtClean="0"/>
-              <a:t>the user what was added to the list. </a:t>
+              <a:t>Use alert box to tell the user what was added to the list. </a:t>
             </a:r>
           </a:p>
         </p:txBody>
@@ -5947,7 +5874,7 @@
           <a:blip r:embed="rId2">
             <a:extLst>
               <a:ext uri="{28A0092B-C50C-407E-A947-70E740481C1C}">
-                <a14:useLocalDpi xmlns:a14="http://schemas.microsoft.com/office/drawing/2010/main" xmlns:p="http://schemas.openxmlformats.org/presentationml/2006/main" xmlns:r="http://schemas.openxmlformats.org/officeDocument/2006/relationships" xmlns:a="http://schemas.openxmlformats.org/drawingml/2006/main" xmlns="" val="0"/>
+                <a14:useLocalDpi xmlns="" xmlns:a="http://schemas.openxmlformats.org/drawingml/2006/main" xmlns:r="http://schemas.openxmlformats.org/officeDocument/2006/relationships" xmlns:p="http://schemas.openxmlformats.org/presentationml/2006/main" xmlns:a14="http://schemas.microsoft.com/office/drawing/2010/main" xmlns:mv="urn:schemas-microsoft-com:mac:vml" xmlns:mc="http://schemas.openxmlformats.org/markup-compatibility/2006" val="0"/>
               </a:ext>
             </a:extLst>
           </a:blip>
@@ -6122,7 +6049,7 @@
     </p:spTree>
     <p:extLst>
       <p:ext uri="{BB962C8B-B14F-4D97-AF65-F5344CB8AC3E}">
-        <p14:creationId xmlns:p14="http://schemas.microsoft.com/office/powerpoint/2010/main" xmlns:p="http://schemas.openxmlformats.org/presentationml/2006/main" xmlns:r="http://schemas.openxmlformats.org/officeDocument/2006/relationships" xmlns:a="http://schemas.openxmlformats.org/drawingml/2006/main" xmlns="" val="2412509238"/>
+        <p14:creationId xmlns="" xmlns:a="http://schemas.openxmlformats.org/drawingml/2006/main" xmlns:r="http://schemas.openxmlformats.org/officeDocument/2006/relationships" xmlns:p="http://schemas.openxmlformats.org/presentationml/2006/main" xmlns:p14="http://schemas.microsoft.com/office/powerpoint/2010/main" xmlns:mv="urn:schemas-microsoft-com:mac:vml" xmlns:mc="http://schemas.openxmlformats.org/markup-compatibility/2006" val="2412509238"/>
       </p:ext>
     </p:extLst>
   </p:cSld>
@@ -6161,7 +6088,7 @@
           <a:blip r:embed="rId2">
             <a:extLst>
               <a:ext uri="{28A0092B-C50C-407E-A947-70E740481C1C}">
-                <a14:useLocalDpi xmlns:a14="http://schemas.microsoft.com/office/drawing/2010/main" xmlns:p="http://schemas.openxmlformats.org/presentationml/2006/main" xmlns:r="http://schemas.openxmlformats.org/officeDocument/2006/relationships" xmlns:a="http://schemas.openxmlformats.org/drawingml/2006/main" xmlns="" val="0"/>
+                <a14:useLocalDpi xmlns="" xmlns:a="http://schemas.openxmlformats.org/drawingml/2006/main" xmlns:r="http://schemas.openxmlformats.org/officeDocument/2006/relationships" xmlns:p="http://schemas.openxmlformats.org/presentationml/2006/main" xmlns:a14="http://schemas.microsoft.com/office/drawing/2010/main" xmlns:mv="urn:schemas-microsoft-com:mac:vml" xmlns:mc="http://schemas.openxmlformats.org/markup-compatibility/2006" val="0"/>
               </a:ext>
             </a:extLst>
           </a:blip>
@@ -6701,27 +6628,7 @@
           <a:p>
             <a:r>
               <a:rPr lang="en-US" dirty="0" smtClean="0"/>
-              <a:t>Suggestion: alert user </a:t>
-            </a:r>
-            <a:r>
-              <a:rPr lang="en-US" dirty="0" smtClean="0"/>
-              <a:t>“Oops!  No </a:t>
-            </a:r>
-            <a:r>
-              <a:rPr lang="en-US" dirty="0" smtClean="0"/>
-              <a:t>text </a:t>
-            </a:r>
-            <a:r>
-              <a:rPr lang="en-US" dirty="0" smtClean="0"/>
-              <a:t>found </a:t>
-            </a:r>
-            <a:r>
-              <a:rPr lang="en-US" dirty="0" smtClean="0"/>
-              <a:t>in image</a:t>
-            </a:r>
-            <a:r>
-              <a:rPr lang="en-US" dirty="0" smtClean="0"/>
-              <a:t>”</a:t>
+              <a:t>Suggestion: alert user “Oops!  No text found in image”</a:t>
             </a:r>
             <a:endParaRPr lang="en-US" dirty="0"/>
           </a:p>
@@ -6800,7 +6707,7 @@
     </p:spTree>
     <p:extLst>
       <p:ext uri="{BB962C8B-B14F-4D97-AF65-F5344CB8AC3E}">
-        <p14:creationId xmlns:p14="http://schemas.microsoft.com/office/powerpoint/2010/main" xmlns:p="http://schemas.openxmlformats.org/presentationml/2006/main" xmlns:r="http://schemas.openxmlformats.org/officeDocument/2006/relationships" xmlns:a="http://schemas.openxmlformats.org/drawingml/2006/main" xmlns="" val="472843982"/>
+        <p14:creationId xmlns="" xmlns:a="http://schemas.openxmlformats.org/drawingml/2006/main" xmlns:r="http://schemas.openxmlformats.org/officeDocument/2006/relationships" xmlns:p="http://schemas.openxmlformats.org/presentationml/2006/main" xmlns:p14="http://schemas.microsoft.com/office/powerpoint/2010/main" xmlns:mv="urn:schemas-microsoft-com:mac:vml" xmlns:mc="http://schemas.openxmlformats.org/markup-compatibility/2006" val="472843982"/>
       </p:ext>
     </p:extLst>
   </p:cSld>

</xml_diff>

<commit_message>
revised text to refer to help
</commit_message>
<xml_diff>
--- a/design/mobile_app_mvp_priorities.pptx
+++ b/design/mobile_app_mvp_priorities.pptx
@@ -3650,7 +3650,7 @@
         <p:spPr>
           <a:xfrm>
             <a:off x="3514414" y="2686615"/>
-            <a:ext cx="5334000" cy="2862323"/>
+            <a:ext cx="5334000" cy="3139321"/>
           </a:xfrm>
           <a:prstGeom prst="rect">
             <a:avLst/>
@@ -3760,7 +3760,23 @@
             </a:pPr>
             <a:r>
               <a:rPr lang="en-US" dirty="0" smtClean="0"/>
-              <a:t> change message to: ‘’No scientific name was found. Please try again.’’</a:t>
+              <a:t> change message to: ‘’No scientific name was found. Please try again</a:t>
+            </a:r>
+            <a:r>
+              <a:rPr lang="en-US" dirty="0" smtClean="0"/>
+              <a:t>.  The Help page has </a:t>
+            </a:r>
+            <a:r>
+              <a:rPr lang="en-US" dirty="0" smtClean="0"/>
+              <a:t>tips on getting good photos.</a:t>
+            </a:r>
+            <a:r>
+              <a:rPr lang="en-US" dirty="0" smtClean="0"/>
+              <a:t>’</a:t>
+            </a:r>
+            <a:r>
+              <a:rPr lang="en-US" dirty="0" smtClean="0"/>
+              <a:t>’</a:t>
             </a:r>
           </a:p>
         </p:txBody>
@@ -3773,8 +3789,8 @@
         </p:nvSpPr>
         <p:spPr>
           <a:xfrm>
-            <a:off x="3801439" y="525489"/>
-            <a:ext cx="5046975" cy="1077218"/>
+            <a:off x="3080994" y="525489"/>
+            <a:ext cx="6487874" cy="1077218"/>
           </a:xfrm>
           <a:prstGeom prst="rect">
             <a:avLst/>
@@ -3790,7 +3806,7 @@
             <a:pPr algn="ctr"/>
             <a:r>
               <a:rPr lang="en-US" sz="3200" dirty="0" smtClean="0"/>
-              <a:t>9. Clarify empty capture alert</a:t>
+              <a:t>9. Instruct user in empty capture alert</a:t>
             </a:r>
           </a:p>
           <a:p>
@@ -4587,7 +4603,7 @@
         </p:blipFill>
         <p:spPr>
           <a:xfrm>
-            <a:off x="492644" y="788307"/>
+            <a:off x="492644" y="1322519"/>
             <a:ext cx="2884558" cy="5128103"/>
           </a:xfrm>
           <a:prstGeom prst="rect">
@@ -5131,8 +5147,8 @@
         </p:nvSpPr>
         <p:spPr>
           <a:xfrm>
-            <a:off x="3158162" y="140086"/>
-            <a:ext cx="2470749" cy="584776"/>
+            <a:off x="643092" y="266976"/>
+            <a:ext cx="3956933" cy="1077218"/>
           </a:xfrm>
           <a:prstGeom prst="rect">
             <a:avLst/>
@@ -5147,7 +5163,21 @@
           <a:p>
             <a:r>
               <a:rPr lang="en-US" sz="3200" dirty="0" smtClean="0"/>
-              <a:t>Priority = low</a:t>
+              <a:t>Alert for no-text-found</a:t>
+            </a:r>
+          </a:p>
+          <a:p>
+            <a:r>
+              <a:rPr lang="en-US" sz="3200" dirty="0" smtClean="0"/>
+              <a:t>Priority </a:t>
+            </a:r>
+            <a:r>
+              <a:rPr lang="en-US" sz="3200" dirty="0" smtClean="0"/>
+              <a:t>= </a:t>
+            </a:r>
+            <a:r>
+              <a:rPr lang="en-US" sz="3200" dirty="0" smtClean="0"/>
+              <a:t>low</a:t>
             </a:r>
             <a:endParaRPr lang="en-US" sz="3200" dirty="0"/>
           </a:p>

</xml_diff>

<commit_message>
revised home view suggestios
</commit_message>
<xml_diff>
--- a/design/mobile_app_mvp_priorities.pptx
+++ b/design/mobile_app_mvp_priorities.pptx
@@ -8,8 +8,8 @@
     <p:sldId id="268" r:id="rId2"/>
     <p:sldId id="265" r:id="rId3"/>
     <p:sldId id="273" r:id="rId4"/>
-    <p:sldId id="270" r:id="rId5"/>
-    <p:sldId id="263" r:id="rId6"/>
+    <p:sldId id="263" r:id="rId5"/>
+    <p:sldId id="270" r:id="rId6"/>
     <p:sldId id="260" r:id="rId7"/>
     <p:sldId id="269" r:id="rId8"/>
     <p:sldId id="272" r:id="rId9"/>
@@ -303,7 +303,7 @@
             <a:fld id="{87E93CD3-EE4A-CD47-805D-649ED515E042}" type="datetimeFigureOut">
               <a:rPr lang="en-US" smtClean="0"/>
               <a:pPr/>
-              <a:t>3/18/16</a:t>
+              <a:t>3/20/16</a:t>
             </a:fld>
             <a:endParaRPr lang="en-US"/>
           </a:p>
@@ -470,7 +470,7 @@
             <a:fld id="{87E93CD3-EE4A-CD47-805D-649ED515E042}" type="datetimeFigureOut">
               <a:rPr lang="en-US" smtClean="0"/>
               <a:pPr/>
-              <a:t>3/18/16</a:t>
+              <a:t>3/20/16</a:t>
             </a:fld>
             <a:endParaRPr lang="en-US"/>
           </a:p>
@@ -647,7 +647,7 @@
             <a:fld id="{87E93CD3-EE4A-CD47-805D-649ED515E042}" type="datetimeFigureOut">
               <a:rPr lang="en-US" smtClean="0"/>
               <a:pPr/>
-              <a:t>3/18/16</a:t>
+              <a:t>3/20/16</a:t>
             </a:fld>
             <a:endParaRPr lang="en-US"/>
           </a:p>
@@ -814,7 +814,7 @@
             <a:fld id="{87E93CD3-EE4A-CD47-805D-649ED515E042}" type="datetimeFigureOut">
               <a:rPr lang="en-US" smtClean="0"/>
               <a:pPr/>
-              <a:t>3/18/16</a:t>
+              <a:t>3/20/16</a:t>
             </a:fld>
             <a:endParaRPr lang="en-US"/>
           </a:p>
@@ -1057,7 +1057,7 @@
             <a:fld id="{87E93CD3-EE4A-CD47-805D-649ED515E042}" type="datetimeFigureOut">
               <a:rPr lang="en-US" smtClean="0"/>
               <a:pPr/>
-              <a:t>3/18/16</a:t>
+              <a:t>3/20/16</a:t>
             </a:fld>
             <a:endParaRPr lang="en-US"/>
           </a:p>
@@ -1342,7 +1342,7 @@
             <a:fld id="{87E93CD3-EE4A-CD47-805D-649ED515E042}" type="datetimeFigureOut">
               <a:rPr lang="en-US" smtClean="0"/>
               <a:pPr/>
-              <a:t>3/18/16</a:t>
+              <a:t>3/20/16</a:t>
             </a:fld>
             <a:endParaRPr lang="en-US"/>
           </a:p>
@@ -1761,7 +1761,7 @@
             <a:fld id="{87E93CD3-EE4A-CD47-805D-649ED515E042}" type="datetimeFigureOut">
               <a:rPr lang="en-US" smtClean="0"/>
               <a:pPr/>
-              <a:t>3/18/16</a:t>
+              <a:t>3/20/16</a:t>
             </a:fld>
             <a:endParaRPr lang="en-US"/>
           </a:p>
@@ -1876,7 +1876,7 @@
             <a:fld id="{87E93CD3-EE4A-CD47-805D-649ED515E042}" type="datetimeFigureOut">
               <a:rPr lang="en-US" smtClean="0"/>
               <a:pPr/>
-              <a:t>3/18/16</a:t>
+              <a:t>3/20/16</a:t>
             </a:fld>
             <a:endParaRPr lang="en-US"/>
           </a:p>
@@ -1968,7 +1968,7 @@
             <a:fld id="{87E93CD3-EE4A-CD47-805D-649ED515E042}" type="datetimeFigureOut">
               <a:rPr lang="en-US" smtClean="0"/>
               <a:pPr/>
-              <a:t>3/18/16</a:t>
+              <a:t>3/20/16</a:t>
             </a:fld>
             <a:endParaRPr lang="en-US"/>
           </a:p>
@@ -2242,7 +2242,7 @@
             <a:fld id="{87E93CD3-EE4A-CD47-805D-649ED515E042}" type="datetimeFigureOut">
               <a:rPr lang="en-US" smtClean="0"/>
               <a:pPr/>
-              <a:t>3/18/16</a:t>
+              <a:t>3/20/16</a:t>
             </a:fld>
             <a:endParaRPr lang="en-US"/>
           </a:p>
@@ -2492,7 +2492,7 @@
             <a:fld id="{87E93CD3-EE4A-CD47-805D-649ED515E042}" type="datetimeFigureOut">
               <a:rPr lang="en-US" smtClean="0"/>
               <a:pPr/>
-              <a:t>3/18/16</a:t>
+              <a:t>3/20/16</a:t>
             </a:fld>
             <a:endParaRPr lang="en-US"/>
           </a:p>
@@ -2702,7 +2702,7 @@
             <a:fld id="{87E93CD3-EE4A-CD47-805D-649ED515E042}" type="datetimeFigureOut">
               <a:rPr lang="en-US" smtClean="0"/>
               <a:pPr/>
-              <a:t>3/18/16</a:t>
+              <a:t>3/20/16</a:t>
             </a:fld>
             <a:endParaRPr lang="en-US"/>
           </a:p>
@@ -3492,15 +3492,7 @@
             <a:pPr marL="514350" indent="-514350" algn="ctr"/>
             <a:r>
               <a:rPr lang="en-US" sz="3200" dirty="0" smtClean="0"/>
-              <a:t>Priority </a:t>
-            </a:r>
-            <a:r>
-              <a:rPr lang="en-US" sz="3200" dirty="0" smtClean="0"/>
-              <a:t>= </a:t>
-            </a:r>
-            <a:r>
-              <a:rPr lang="en-US" sz="3200" dirty="0" smtClean="0"/>
-              <a:t>medium</a:t>
+              <a:t>Priority = medium</a:t>
             </a:r>
             <a:endParaRPr lang="en-US" sz="3200" dirty="0"/>
           </a:p>
@@ -3623,7 +3615,7 @@
           <a:blip r:embed="rId2">
             <a:extLst>
               <a:ext uri="{28A0092B-C50C-407E-A947-70E740481C1C}">
-                <a14:useLocalDpi xmlns="" xmlns:a="http://schemas.openxmlformats.org/drawingml/2006/main" xmlns:r="http://schemas.openxmlformats.org/officeDocument/2006/relationships" xmlns:p="http://schemas.openxmlformats.org/presentationml/2006/main" xmlns:a14="http://schemas.microsoft.com/office/drawing/2010/main" xmlns:mv="urn:schemas-microsoft-com:mac:vml" xmlns:mc="http://schemas.openxmlformats.org/markup-compatibility/2006" val="0"/>
+                <a14:useLocalDpi xmlns:mc="http://schemas.openxmlformats.org/markup-compatibility/2006" xmlns:mv="urn:schemas-microsoft-com:mac:vml" xmlns:a14="http://schemas.microsoft.com/office/drawing/2010/main" xmlns:p="http://schemas.openxmlformats.org/presentationml/2006/main" xmlns:r="http://schemas.openxmlformats.org/officeDocument/2006/relationships" xmlns:a="http://schemas.openxmlformats.org/drawingml/2006/main" xmlns="" val="0"/>
               </a:ext>
             </a:extLst>
           </a:blip>
@@ -3760,23 +3752,7 @@
             </a:pPr>
             <a:r>
               <a:rPr lang="en-US" dirty="0" smtClean="0"/>
-              <a:t> change message to: ‘’No scientific name was found. Please try again</a:t>
-            </a:r>
-            <a:r>
-              <a:rPr lang="en-US" dirty="0" smtClean="0"/>
-              <a:t>.  The Help page has </a:t>
-            </a:r>
-            <a:r>
-              <a:rPr lang="en-US" dirty="0" smtClean="0"/>
-              <a:t>tips on getting good photos.</a:t>
-            </a:r>
-            <a:r>
-              <a:rPr lang="en-US" dirty="0" smtClean="0"/>
-              <a:t>’</a:t>
-            </a:r>
-            <a:r>
-              <a:rPr lang="en-US" dirty="0" smtClean="0"/>
-              <a:t>’</a:t>
+              <a:t> change message to: ‘’No scientific name was found. Please try again.  The Help page has tips on getting good photos.’’</a:t>
             </a:r>
           </a:p>
         </p:txBody>
@@ -3789,8 +3765,8 @@
         </p:nvSpPr>
         <p:spPr>
           <a:xfrm>
-            <a:off x="3080994" y="525489"/>
-            <a:ext cx="6487874" cy="1077218"/>
+            <a:off x="3080994" y="525488"/>
+            <a:ext cx="6063006" cy="1569660"/>
           </a:xfrm>
           <a:prstGeom prst="rect">
             <a:avLst/>
@@ -3798,7 +3774,7 @@
           <a:noFill/>
         </p:spPr>
         <p:txBody>
-          <a:bodyPr wrap="none" rtlCol="0">
+          <a:bodyPr wrap="square" rtlCol="0">
             <a:spAutoFit/>
           </a:bodyPr>
           <a:lstStyle/>
@@ -3813,15 +3789,7 @@
             <a:pPr algn="ctr"/>
             <a:r>
               <a:rPr lang="en-US" sz="3200" dirty="0" smtClean="0"/>
-              <a:t>Priority </a:t>
-            </a:r>
-            <a:r>
-              <a:rPr lang="en-US" sz="3200" dirty="0" smtClean="0"/>
-              <a:t>=</a:t>
-            </a:r>
-            <a:r>
-              <a:rPr lang="en-US" sz="3200" dirty="0" smtClean="0"/>
-              <a:t> low</a:t>
+              <a:t>Priority = low</a:t>
             </a:r>
             <a:endParaRPr lang="en-US" sz="3200" dirty="0"/>
           </a:p>
@@ -3830,7 +3798,7 @@
     </p:spTree>
     <p:extLst>
       <p:ext uri="{BB962C8B-B14F-4D97-AF65-F5344CB8AC3E}">
-        <p14:creationId xmlns="" xmlns:a="http://schemas.openxmlformats.org/drawingml/2006/main" xmlns:r="http://schemas.openxmlformats.org/officeDocument/2006/relationships" xmlns:p="http://schemas.openxmlformats.org/presentationml/2006/main" xmlns:p14="http://schemas.microsoft.com/office/powerpoint/2010/main" xmlns:mv="urn:schemas-microsoft-com:mac:vml" xmlns:mc="http://schemas.openxmlformats.org/markup-compatibility/2006" val="2412509238"/>
+        <p14:creationId xmlns:mc="http://schemas.openxmlformats.org/markup-compatibility/2006" xmlns:mv="urn:schemas-microsoft-com:mac:vml" xmlns:p14="http://schemas.microsoft.com/office/powerpoint/2010/main" xmlns:p="http://schemas.openxmlformats.org/presentationml/2006/main" xmlns:r="http://schemas.openxmlformats.org/officeDocument/2006/relationships" xmlns:a="http://schemas.openxmlformats.org/drawingml/2006/main" xmlns="" val="2412509238"/>
       </p:ext>
     </p:extLst>
   </p:cSld>
@@ -3931,7 +3899,6 @@
               <a:rPr lang="en-US" dirty="0" smtClean="0"/>
               <a:t> rounded corners on alert boxes</a:t>
             </a:r>
-            <a:endParaRPr lang="en-US" dirty="0" smtClean="0"/>
           </a:p>
         </p:txBody>
       </p:sp>
@@ -3991,15 +3958,7 @@
             <a:pPr algn="ctr"/>
             <a:r>
               <a:rPr lang="en-US" sz="3200" dirty="0" smtClean="0"/>
-              <a:t>Priority </a:t>
-            </a:r>
-            <a:r>
-              <a:rPr lang="en-US" sz="3200" dirty="0" smtClean="0"/>
-              <a:t>=</a:t>
-            </a:r>
-            <a:r>
-              <a:rPr lang="en-US" sz="3200" dirty="0" smtClean="0"/>
-              <a:t> low</a:t>
+              <a:t>Priority = low</a:t>
             </a:r>
             <a:endParaRPr lang="en-US" sz="3200" dirty="0"/>
           </a:p>
@@ -4313,22 +4272,14 @@
             <a:pPr algn="ctr"/>
             <a:r>
               <a:rPr lang="en-US" sz="3200" dirty="0" smtClean="0"/>
-              <a:t>11. More informative alert on </a:t>
-            </a:r>
+              <a:t>11. More informative alert on login fail</a:t>
+            </a:r>
+          </a:p>
+          <a:p>
+            <a:pPr algn="ctr"/>
             <a:r>
               <a:rPr lang="en-US" sz="3200" dirty="0" smtClean="0"/>
-              <a:t>login fail</a:t>
-            </a:r>
-          </a:p>
-          <a:p>
-            <a:pPr algn="ctr"/>
-            <a:r>
-              <a:rPr lang="en-US" sz="3200" dirty="0" smtClean="0"/>
-              <a:t>Priority </a:t>
-            </a:r>
-            <a:r>
-              <a:rPr lang="en-US" sz="3200" dirty="0" smtClean="0"/>
-              <a:t>= low</a:t>
+              <a:t>Priority = low</a:t>
             </a:r>
             <a:endParaRPr lang="en-US" sz="3200" dirty="0"/>
           </a:p>
@@ -4539,11 +4490,7 @@
             <a:pPr marL="514350" indent="-514350" algn="ctr"/>
             <a:r>
               <a:rPr lang="en-US" sz="3200" dirty="0" smtClean="0"/>
-              <a:t>Priority </a:t>
-            </a:r>
-            <a:r>
-              <a:rPr lang="en-US" sz="3200" dirty="0" smtClean="0"/>
-              <a:t>= low</a:t>
+              <a:t>Priority = low</a:t>
             </a:r>
             <a:endParaRPr lang="en-US" sz="3200" dirty="0"/>
           </a:p>
@@ -4593,7 +4540,7 @@
           <a:blip r:embed="rId2">
             <a:extLst>
               <a:ext uri="{28A0092B-C50C-407E-A947-70E740481C1C}">
-                <a14:useLocalDpi xmlns="" xmlns:a="http://schemas.openxmlformats.org/drawingml/2006/main" xmlns:r="http://schemas.openxmlformats.org/officeDocument/2006/relationships" xmlns:p="http://schemas.openxmlformats.org/presentationml/2006/main" xmlns:a14="http://schemas.microsoft.com/office/drawing/2010/main" xmlns:mv="urn:schemas-microsoft-com:mac:vml" xmlns:mc="http://schemas.openxmlformats.org/markup-compatibility/2006" val="0"/>
+                <a14:useLocalDpi xmlns:mc="http://schemas.openxmlformats.org/markup-compatibility/2006" xmlns:mv="urn:schemas-microsoft-com:mac:vml" xmlns:a14="http://schemas.microsoft.com/office/drawing/2010/main" xmlns:p="http://schemas.openxmlformats.org/presentationml/2006/main" xmlns:r="http://schemas.openxmlformats.org/officeDocument/2006/relationships" xmlns:a="http://schemas.openxmlformats.org/drawingml/2006/main" xmlns="" val="0"/>
               </a:ext>
             </a:extLst>
           </a:blip>
@@ -5169,15 +5116,7 @@
           <a:p>
             <a:r>
               <a:rPr lang="en-US" sz="3200" dirty="0" smtClean="0"/>
-              <a:t>Priority </a:t>
-            </a:r>
-            <a:r>
-              <a:rPr lang="en-US" sz="3200" dirty="0" smtClean="0"/>
-              <a:t>= </a:t>
-            </a:r>
-            <a:r>
-              <a:rPr lang="en-US" sz="3200" dirty="0" smtClean="0"/>
-              <a:t>low</a:t>
+              <a:t>Priority = low</a:t>
             </a:r>
             <a:endParaRPr lang="en-US" sz="3200" dirty="0"/>
           </a:p>
@@ -5226,7 +5165,7 @@
     </p:spTree>
     <p:extLst>
       <p:ext uri="{BB962C8B-B14F-4D97-AF65-F5344CB8AC3E}">
-        <p14:creationId xmlns="" xmlns:a="http://schemas.openxmlformats.org/drawingml/2006/main" xmlns:r="http://schemas.openxmlformats.org/officeDocument/2006/relationships" xmlns:p="http://schemas.openxmlformats.org/presentationml/2006/main" xmlns:p14="http://schemas.microsoft.com/office/powerpoint/2010/main" xmlns:mv="urn:schemas-microsoft-com:mac:vml" xmlns:mc="http://schemas.openxmlformats.org/markup-compatibility/2006" val="472843982"/>
+        <p14:creationId xmlns:mc="http://schemas.openxmlformats.org/markup-compatibility/2006" xmlns:mv="urn:schemas-microsoft-com:mac:vml" xmlns:p14="http://schemas.microsoft.com/office/powerpoint/2010/main" xmlns:p="http://schemas.openxmlformats.org/presentationml/2006/main" xmlns:r="http://schemas.openxmlformats.org/officeDocument/2006/relationships" xmlns:a="http://schemas.openxmlformats.org/drawingml/2006/main" xmlns="" val="472843982"/>
       </p:ext>
     </p:extLst>
   </p:cSld>
@@ -5437,7 +5376,7 @@
           <a:blip r:embed="rId3">
             <a:extLst>
               <a:ext uri="{28A0092B-C50C-407E-A947-70E740481C1C}">
-                <a14:useLocalDpi xmlns="" xmlns:a="http://schemas.openxmlformats.org/drawingml/2006/main" xmlns:r="http://schemas.openxmlformats.org/officeDocument/2006/relationships" xmlns:p="http://schemas.openxmlformats.org/presentationml/2006/main" xmlns:a14="http://schemas.microsoft.com/office/drawing/2010/main" xmlns:mv="urn:schemas-microsoft-com:mac:vml" xmlns:mc="http://schemas.openxmlformats.org/markup-compatibility/2006" val="0"/>
+                <a14:useLocalDpi xmlns:mc="http://schemas.openxmlformats.org/markup-compatibility/2006" xmlns:mv="urn:schemas-microsoft-com:mac:vml" xmlns:a14="http://schemas.microsoft.com/office/drawing/2010/main" xmlns:p="http://schemas.openxmlformats.org/presentationml/2006/main" xmlns:r="http://schemas.openxmlformats.org/officeDocument/2006/relationships" xmlns:a="http://schemas.openxmlformats.org/drawingml/2006/main" xmlns="" val="0"/>
               </a:ext>
             </a:extLst>
           </a:blip>
@@ -5467,7 +5406,7 @@
           <a:blip r:embed="rId4">
             <a:extLst>
               <a:ext uri="{28A0092B-C50C-407E-A947-70E740481C1C}">
-                <a14:useLocalDpi xmlns="" xmlns:a="http://schemas.openxmlformats.org/drawingml/2006/main" xmlns:r="http://schemas.openxmlformats.org/officeDocument/2006/relationships" xmlns:p="http://schemas.openxmlformats.org/presentationml/2006/main" xmlns:a14="http://schemas.microsoft.com/office/drawing/2010/main" xmlns:mv="urn:schemas-microsoft-com:mac:vml" xmlns:mc="http://schemas.openxmlformats.org/markup-compatibility/2006" val="0"/>
+                <a14:useLocalDpi xmlns:mc="http://schemas.openxmlformats.org/markup-compatibility/2006" xmlns:mv="urn:schemas-microsoft-com:mac:vml" xmlns:a14="http://schemas.microsoft.com/office/drawing/2010/main" xmlns:p="http://schemas.openxmlformats.org/presentationml/2006/main" xmlns:r="http://schemas.openxmlformats.org/officeDocument/2006/relationships" xmlns:a="http://schemas.openxmlformats.org/drawingml/2006/main" xmlns="" val="0"/>
               </a:ext>
             </a:extLst>
           </a:blip>
@@ -5603,7 +5542,7 @@
     </p:spTree>
     <p:extLst>
       <p:ext uri="{BB962C8B-B14F-4D97-AF65-F5344CB8AC3E}">
-        <p14:creationId xmlns="" xmlns:a="http://schemas.openxmlformats.org/drawingml/2006/main" xmlns:r="http://schemas.openxmlformats.org/officeDocument/2006/relationships" xmlns:p="http://schemas.openxmlformats.org/presentationml/2006/main" xmlns:p14="http://schemas.microsoft.com/office/powerpoint/2010/main" xmlns:mv="urn:schemas-microsoft-com:mac:vml" xmlns:mc="http://schemas.openxmlformats.org/markup-compatibility/2006" val="1864991049"/>
+        <p14:creationId xmlns:mc="http://schemas.openxmlformats.org/markup-compatibility/2006" xmlns:mv="urn:schemas-microsoft-com:mac:vml" xmlns:p14="http://schemas.microsoft.com/office/powerpoint/2010/main" xmlns:p="http://schemas.openxmlformats.org/presentationml/2006/main" xmlns:r="http://schemas.openxmlformats.org/officeDocument/2006/relationships" xmlns:a="http://schemas.openxmlformats.org/drawingml/2006/main" xmlns="" val="1864991049"/>
       </p:ext>
     </p:extLst>
   </p:cSld>
@@ -5710,26 +5649,14 @@
             <a:pPr algn="ctr"/>
             <a:r>
               <a:rPr lang="en-US" sz="3200" dirty="0" smtClean="0"/>
-              <a:t>1. </a:t>
-            </a:r>
+              <a:t>1. Add help on 2 new features </a:t>
+            </a:r>
+          </a:p>
+          <a:p>
+            <a:pPr algn="ctr"/>
             <a:r>
               <a:rPr lang="en-US" sz="3200" dirty="0" smtClean="0"/>
-              <a:t>Add help on 2 new features</a:t>
-            </a:r>
-            <a:r>
-              <a:rPr lang="en-US" sz="3200" dirty="0" smtClean="0"/>
-              <a:t> </a:t>
-            </a:r>
-          </a:p>
-          <a:p>
-            <a:pPr algn="ctr"/>
-            <a:r>
-              <a:rPr lang="en-US" sz="3200" dirty="0" smtClean="0"/>
-              <a:t>Priority </a:t>
-            </a:r>
-            <a:r>
-              <a:rPr lang="en-US" sz="3200" dirty="0" smtClean="0"/>
-              <a:t>= medium</a:t>
+              <a:t>Priority = medium</a:t>
             </a:r>
             <a:endParaRPr lang="en-US" sz="3200" dirty="0"/>
           </a:p>
@@ -5833,7 +5760,6 @@
               <a:rPr lang="en-US" i="1" dirty="0" smtClean="0"/>
               <a:t>3. Insert:</a:t>
             </a:r>
-            <a:endParaRPr lang="en-US" i="1" dirty="0" smtClean="0"/>
           </a:p>
           <a:p>
             <a:r>
@@ -5854,17 +5780,8 @@
             </a:r>
             <a:r>
               <a:rPr lang="en-US" dirty="0" smtClean="0"/>
-              <a:t>, </a:t>
-            </a:r>
-            <a:r>
-              <a:rPr lang="en-US" dirty="0" smtClean="0"/>
-              <a:t>then use the browser’s</a:t>
-            </a:r>
-            <a:r>
-              <a:rPr lang="en-US" dirty="0" smtClean="0"/>
-              <a:t> sharing features.</a:t>
-            </a:r>
-            <a:endParaRPr lang="en-US" dirty="0" smtClean="0"/>
+              <a:t>, then use the browser’s sharing features.</a:t>
+            </a:r>
           </a:p>
         </p:txBody>
       </p:sp>
@@ -5940,23 +5857,7 @@
           <a:p>
             <a:r>
               <a:rPr lang="en-US" dirty="0" smtClean="0"/>
-              <a:t>1. Too much whitespace. </a:t>
-            </a:r>
-            <a:r>
-              <a:rPr lang="en-US" dirty="0" smtClean="0"/>
-              <a:t> </a:t>
-            </a:r>
-            <a:r>
-              <a:rPr lang="en-US" dirty="0" smtClean="0"/>
-              <a:t>Do we have </a:t>
-            </a:r>
-            <a:r>
-              <a:rPr lang="en-US" dirty="0" smtClean="0"/>
-              <a:t>a </a:t>
-            </a:r>
-            <a:r>
-              <a:rPr lang="en-US" dirty="0" smtClean="0"/>
-              <a:t>font and line-spacing that makes this more compact?  You may have to tweak the </a:t>
+              <a:t>1. Too much whitespace.  Do we have a font and line-spacing that makes this more compact?  You may have to tweak the </a:t>
             </a:r>
             <a:r>
               <a:rPr lang="en-US" dirty="0" err="1" smtClean="0"/>
@@ -6049,7 +5950,7 @@
         </p:blipFill>
         <p:spPr>
           <a:xfrm>
-            <a:off x="928163" y="1407251"/>
+            <a:off x="1069270" y="1425068"/>
             <a:ext cx="2605268" cy="4623976"/>
           </a:xfrm>
           <a:prstGeom prst="rect">
@@ -6059,14 +5960,58 @@
       </p:pic>
       <p:sp>
         <p:nvSpPr>
-          <p:cNvPr id="12" name="TextBox 11"/>
+          <p:cNvPr id="18" name="TextBox 17"/>
           <p:cNvSpPr txBox="1"/>
           <p:nvPr/>
         </p:nvSpPr>
         <p:spPr>
           <a:xfrm>
-            <a:off x="5209327" y="760920"/>
-            <a:ext cx="3453807" cy="646331"/>
+            <a:off x="466567" y="277302"/>
+            <a:ext cx="6768800" cy="1077218"/>
+          </a:xfrm>
+          <a:prstGeom prst="rect">
+            <a:avLst/>
+          </a:prstGeom>
+          <a:noFill/>
+        </p:spPr>
+        <p:txBody>
+          <a:bodyPr wrap="none" rtlCol="0">
+            <a:spAutoFit/>
+          </a:bodyPr>
+          <a:lstStyle/>
+          <a:p>
+            <a:r>
+              <a:rPr lang="en-US" sz="3200" dirty="0" smtClean="0"/>
+              <a:t>2</a:t>
+            </a:r>
+            <a:r>
+              <a:rPr lang="en-US" sz="3200" dirty="0" smtClean="0"/>
+              <a:t>. </a:t>
+            </a:r>
+            <a:r>
+              <a:rPr lang="en-US" sz="3200" dirty="0" smtClean="0"/>
+              <a:t>Clarify expected flow in Capture view</a:t>
+            </a:r>
+          </a:p>
+          <a:p>
+            <a:r>
+              <a:rPr lang="en-US" sz="3200" dirty="0" smtClean="0"/>
+              <a:t>Priority = medium</a:t>
+            </a:r>
+            <a:endParaRPr lang="en-US" sz="3200" dirty="0"/>
+          </a:p>
+        </p:txBody>
+      </p:sp>
+      <p:sp>
+        <p:nvSpPr>
+          <p:cNvPr id="19" name="TextBox 18"/>
+          <p:cNvSpPr txBox="1"/>
+          <p:nvPr/>
+        </p:nvSpPr>
+        <p:spPr>
+          <a:xfrm>
+            <a:off x="5293360" y="3550312"/>
+            <a:ext cx="3302000" cy="2031325"/>
           </a:xfrm>
           <a:prstGeom prst="rect">
             <a:avLst/>
@@ -6094,86 +6039,159 @@
           <a:p>
             <a:r>
               <a:rPr lang="en-US" dirty="0" smtClean="0"/>
-              <a:t>Use alert box to tell the user what was added to the list. </a:t>
-            </a:r>
-          </a:p>
-        </p:txBody>
-      </p:sp>
-      <p:sp>
-        <p:nvSpPr>
-          <p:cNvPr id="2" name="Rectangle 1"/>
-          <p:cNvSpPr/>
-          <p:nvPr/>
-        </p:nvSpPr>
-        <p:spPr>
-          <a:xfrm>
-            <a:off x="4619450" y="2189890"/>
-            <a:ext cx="1981142" cy="1613522"/>
-          </a:xfrm>
-          <a:prstGeom prst="rect">
-            <a:avLst/>
-          </a:prstGeom>
+              <a:t>Don’t allow cancel, just “OK” (see previous slide).  The usual workflow is to repeat the capture step.  When done, the user will choose </a:t>
+            </a:r>
+            <a:r>
+              <a:rPr lang="en-US" dirty="0" smtClean="0"/>
+              <a:t>“View </a:t>
+            </a:r>
+            <a:r>
+              <a:rPr lang="en-US" dirty="0" smtClean="0"/>
+              <a:t>list” to see the results.  See the</a:t>
+            </a:r>
+            <a:r>
+              <a:rPr lang="en-US" dirty="0" smtClean="0"/>
+              <a:t> next slide </a:t>
+            </a:r>
+            <a:r>
+              <a:rPr lang="en-US" dirty="0" smtClean="0"/>
+              <a:t>for the capture message. </a:t>
+            </a:r>
+            <a:endParaRPr lang="en-US" dirty="0"/>
+          </a:p>
+        </p:txBody>
+      </p:sp>
+      <p:cxnSp>
+        <p:nvCxnSpPr>
+          <p:cNvPr id="21" name="Straight Arrow Connector 20"/>
+          <p:cNvCxnSpPr>
+            <a:stCxn id="19" idx="1"/>
+          </p:cNvCxnSpPr>
+          <p:nvPr/>
+        </p:nvCxnSpPr>
+        <p:spPr>
+          <a:xfrm rot="10800000">
+            <a:off x="2184400" y="4262771"/>
+            <a:ext cx="3108960" cy="303204"/>
+          </a:xfrm>
+          <a:prstGeom prst="straightConnector1">
+            <a:avLst/>
+          </a:prstGeom>
+          <a:ln>
+            <a:tailEnd type="arrow"/>
+          </a:ln>
         </p:spPr>
         <p:style>
           <a:lnRef idx="2">
-            <a:schemeClr val="dk1"/>
+            <a:schemeClr val="accent1"/>
           </a:lnRef>
-          <a:fillRef idx="1">
-            <a:schemeClr val="lt1"/>
+          <a:fillRef idx="0">
+            <a:schemeClr val="accent1"/>
           </a:fillRef>
-          <a:effectRef idx="0">
-            <a:schemeClr val="dk1"/>
+          <a:effectRef idx="1">
+            <a:schemeClr val="accent1"/>
+          </a:effectRef>
+          <a:fontRef idx="minor">
+            <a:schemeClr val="tx1"/>
+          </a:fontRef>
+        </p:style>
+      </p:cxnSp>
+      <p:sp>
+        <p:nvSpPr>
+          <p:cNvPr id="23" name="TextBox 22"/>
+          <p:cNvSpPr txBox="1"/>
+          <p:nvPr/>
+        </p:nvSpPr>
+        <p:spPr>
+          <a:xfrm>
+            <a:off x="5896509" y="1702422"/>
+            <a:ext cx="2042160" cy="923330"/>
+          </a:xfrm>
+          <a:prstGeom prst="rect">
+            <a:avLst/>
+          </a:prstGeom>
+        </p:spPr>
+        <p:style>
+          <a:lnRef idx="1">
+            <a:schemeClr val="accent1"/>
+          </a:lnRef>
+          <a:fillRef idx="2">
+            <a:schemeClr val="accent1"/>
+          </a:fillRef>
+          <a:effectRef idx="1">
+            <a:schemeClr val="accent1"/>
           </a:effectRef>
           <a:fontRef idx="minor">
             <a:schemeClr val="dk1"/>
           </a:fontRef>
         </p:style>
         <p:txBody>
-          <a:bodyPr rtlCol="0" anchor="t" anchorCtr="0"/>
-          <a:lstStyle/>
-          <a:p>
-            <a:pPr algn="ctr"/>
+          <a:bodyPr wrap="square" rtlCol="0">
+            <a:spAutoFit/>
+          </a:bodyPr>
+          <a:lstStyle/>
+          <a:p>
             <a:r>
               <a:rPr lang="en-US" dirty="0" smtClean="0"/>
-              <a:t>Success!</a:t>
-            </a:r>
-          </a:p>
-          <a:p>
-            <a:pPr algn="ctr"/>
-            <a:endParaRPr lang="en-US" sz="900" dirty="0" smtClean="0"/>
-          </a:p>
-          <a:p>
-            <a:pPr algn="ctr"/>
-            <a:r>
-              <a:rPr lang="en-US" sz="1400" dirty="0" smtClean="0"/>
-              <a:t>Names added: </a:t>
-            </a:r>
-            <a:r>
-              <a:rPr lang="en-US" sz="1400" dirty="0" err="1" smtClean="0"/>
-              <a:t>Lophodytes</a:t>
-            </a:r>
-            <a:r>
-              <a:rPr lang="en-US" sz="1400" dirty="0" smtClean="0"/>
-              <a:t> </a:t>
-            </a:r>
-            <a:r>
-              <a:rPr lang="en-US" sz="1400" dirty="0" err="1" smtClean="0"/>
-              <a:t>cucullatus</a:t>
-            </a:r>
-            <a:endParaRPr lang="en-US" sz="1400" dirty="0"/>
-          </a:p>
-        </p:txBody>
-      </p:sp>
-      <p:sp>
-        <p:nvSpPr>
-          <p:cNvPr id="3" name="TextBox 2"/>
+              <a:t>Replace “Species names” with </a:t>
+            </a:r>
+            <a:r>
+              <a:rPr lang="en-US" dirty="0" smtClean="0"/>
+              <a:t>“View </a:t>
+            </a:r>
+            <a:r>
+              <a:rPr lang="en-US" dirty="0" smtClean="0"/>
+              <a:t>list”</a:t>
+            </a:r>
+            <a:endParaRPr lang="en-US" dirty="0"/>
+          </a:p>
+        </p:txBody>
+      </p:sp>
+      <p:cxnSp>
+        <p:nvCxnSpPr>
+          <p:cNvPr id="24" name="Straight Arrow Connector 23"/>
+          <p:cNvCxnSpPr>
+            <a:stCxn id="23" idx="1"/>
+          </p:cNvCxnSpPr>
+          <p:nvPr/>
+        </p:nvCxnSpPr>
+        <p:spPr>
+          <a:xfrm rot="10800000">
+            <a:off x="3555671" y="2017387"/>
+            <a:ext cx="2340839" cy="146701"/>
+          </a:xfrm>
+          <a:prstGeom prst="straightConnector1">
+            <a:avLst/>
+          </a:prstGeom>
+          <a:ln>
+            <a:tailEnd type="arrow"/>
+          </a:ln>
+        </p:spPr>
+        <p:style>
+          <a:lnRef idx="2">
+            <a:schemeClr val="accent1"/>
+          </a:lnRef>
+          <a:fillRef idx="0">
+            <a:schemeClr val="accent1"/>
+          </a:fillRef>
+          <a:effectRef idx="1">
+            <a:schemeClr val="accent1"/>
+          </a:effectRef>
+          <a:fontRef idx="minor">
+            <a:schemeClr val="tx1"/>
+          </a:fontRef>
+        </p:style>
+      </p:cxnSp>
+      <p:sp>
+        <p:nvSpPr>
+          <p:cNvPr id="27" name="TextBox 26"/>
           <p:cNvSpPr txBox="1"/>
           <p:nvPr/>
         </p:nvSpPr>
         <p:spPr>
           <a:xfrm>
-            <a:off x="4259359" y="1820559"/>
-            <a:ext cx="884940" cy="369332"/>
+            <a:off x="2787549" y="1786552"/>
+            <a:ext cx="676133" cy="253916"/>
           </a:xfrm>
           <a:prstGeom prst="rect">
             <a:avLst/>
@@ -6187,255 +6205,32 @@
           <a:lstStyle/>
           <a:p>
             <a:r>
-              <a:rPr lang="en-US" dirty="0" smtClean="0"/>
-              <a:t>1 name</a:t>
-            </a:r>
-            <a:endParaRPr lang="en-US" dirty="0"/>
-          </a:p>
-        </p:txBody>
-      </p:sp>
-      <p:sp>
-        <p:nvSpPr>
-          <p:cNvPr id="8" name="TextBox 7"/>
-          <p:cNvSpPr txBox="1"/>
-          <p:nvPr/>
-        </p:nvSpPr>
-        <p:spPr>
-          <a:xfrm>
-            <a:off x="4259359" y="4640465"/>
-            <a:ext cx="1227042" cy="923330"/>
-          </a:xfrm>
-          <a:prstGeom prst="rect">
-            <a:avLst/>
-          </a:prstGeom>
-          <a:noFill/>
-        </p:spPr>
-        <p:txBody>
-          <a:bodyPr wrap="square" rtlCol="0">
-            <a:spAutoFit/>
-          </a:bodyPr>
-          <a:lstStyle/>
-          <a:p>
-            <a:r>
-              <a:rPr lang="en-US" dirty="0" smtClean="0"/>
-              <a:t>&gt; 1 names:</a:t>
-            </a:r>
-          </a:p>
-          <a:p>
-            <a:r>
-              <a:rPr lang="en-US" dirty="0" smtClean="0"/>
-              <a:t>Tell user how many</a:t>
-            </a:r>
-            <a:endParaRPr lang="en-US" dirty="0"/>
-          </a:p>
-        </p:txBody>
-      </p:sp>
-      <p:sp>
-        <p:nvSpPr>
-          <p:cNvPr id="4" name="Rounded Rectangle 3"/>
-          <p:cNvSpPr/>
-          <p:nvPr/>
-        </p:nvSpPr>
-        <p:spPr>
-          <a:xfrm>
-            <a:off x="5015297" y="3305572"/>
-            <a:ext cx="1011474" cy="325903"/>
-          </a:xfrm>
-          <a:prstGeom prst="roundRect">
-            <a:avLst/>
-          </a:prstGeom>
-        </p:spPr>
-        <p:style>
-          <a:lnRef idx="2">
-            <a:schemeClr val="accent1">
-              <a:shade val="50000"/>
-            </a:schemeClr>
-          </a:lnRef>
-          <a:fillRef idx="1">
-            <a:schemeClr val="accent1"/>
-          </a:fillRef>
-          <a:effectRef idx="0">
-            <a:schemeClr val="accent1"/>
-          </a:effectRef>
-          <a:fontRef idx="minor">
-            <a:schemeClr val="lt1"/>
-          </a:fontRef>
-        </p:style>
-        <p:txBody>
-          <a:bodyPr rtlCol="0" anchor="ctr"/>
-          <a:lstStyle/>
-          <a:p>
-            <a:pPr algn="ctr"/>
-            <a:r>
-              <a:rPr lang="en-US" dirty="0" smtClean="0"/>
-              <a:t>OK</a:t>
-            </a:r>
-            <a:endParaRPr lang="en-US" dirty="0"/>
-          </a:p>
-        </p:txBody>
-      </p:sp>
-      <p:sp>
-        <p:nvSpPr>
-          <p:cNvPr id="14" name="Rectangle 13"/>
-          <p:cNvSpPr/>
-          <p:nvPr/>
-        </p:nvSpPr>
-        <p:spPr>
-          <a:xfrm>
-            <a:off x="5627381" y="4429637"/>
-            <a:ext cx="1981142" cy="1859403"/>
-          </a:xfrm>
-          <a:prstGeom prst="rect">
-            <a:avLst/>
-          </a:prstGeom>
-        </p:spPr>
-        <p:style>
-          <a:lnRef idx="2">
-            <a:schemeClr val="dk1"/>
-          </a:lnRef>
-          <a:fillRef idx="1">
-            <a:schemeClr val="lt1"/>
-          </a:fillRef>
-          <a:effectRef idx="0">
-            <a:schemeClr val="dk1"/>
-          </a:effectRef>
-          <a:fontRef idx="minor">
-            <a:schemeClr val="dk1"/>
-          </a:fontRef>
-        </p:style>
-        <p:txBody>
-          <a:bodyPr rtlCol="0" anchor="t" anchorCtr="0"/>
-          <a:lstStyle/>
-          <a:p>
-            <a:pPr algn="ctr"/>
-            <a:r>
-              <a:rPr lang="en-US" dirty="0" smtClean="0"/>
-              <a:t>Success!</a:t>
-            </a:r>
-          </a:p>
-          <a:p>
-            <a:pPr algn="ctr"/>
-            <a:endParaRPr lang="en-US" sz="900" dirty="0" smtClean="0"/>
-          </a:p>
-          <a:p>
-            <a:pPr algn="ctr"/>
-            <a:r>
-              <a:rPr lang="en-US" sz="1400" dirty="0" smtClean="0"/>
-              <a:t>Names added: </a:t>
-            </a:r>
-            <a:r>
-              <a:rPr lang="en-US" sz="1400" dirty="0" err="1" smtClean="0"/>
-              <a:t>Lophodytes</a:t>
-            </a:r>
-            <a:r>
-              <a:rPr lang="en-US" sz="1400" dirty="0" smtClean="0"/>
-              <a:t> </a:t>
-            </a:r>
-            <a:r>
-              <a:rPr lang="en-US" sz="1400" dirty="0" err="1" smtClean="0"/>
-              <a:t>cucullatus</a:t>
-            </a:r>
-            <a:r>
-              <a:rPr lang="en-US" sz="1400" dirty="0" smtClean="0"/>
-              <a:t> and </a:t>
-            </a:r>
-            <a:r>
-              <a:rPr lang="en-US" b="1" dirty="0" smtClean="0"/>
-              <a:t>X </a:t>
-            </a:r>
-            <a:r>
-              <a:rPr lang="en-US" sz="1400" dirty="0" smtClean="0"/>
-              <a:t>others</a:t>
-            </a:r>
-            <a:endParaRPr lang="en-US" sz="1400" dirty="0"/>
-          </a:p>
-        </p:txBody>
-      </p:sp>
-      <p:sp>
-        <p:nvSpPr>
-          <p:cNvPr id="15" name="Rounded Rectangle 14"/>
-          <p:cNvSpPr/>
-          <p:nvPr/>
-        </p:nvSpPr>
-        <p:spPr>
-          <a:xfrm>
-            <a:off x="6079277" y="5773434"/>
-            <a:ext cx="1011474" cy="325903"/>
-          </a:xfrm>
-          <a:prstGeom prst="roundRect">
-            <a:avLst/>
-          </a:prstGeom>
-        </p:spPr>
-        <p:style>
-          <a:lnRef idx="2">
-            <a:schemeClr val="accent1">
-              <a:shade val="50000"/>
-            </a:schemeClr>
-          </a:lnRef>
-          <a:fillRef idx="1">
-            <a:schemeClr val="accent1"/>
-          </a:fillRef>
-          <a:effectRef idx="0">
-            <a:schemeClr val="accent1"/>
-          </a:effectRef>
-          <a:fontRef idx="minor">
-            <a:schemeClr val="lt1"/>
-          </a:fontRef>
-        </p:style>
-        <p:txBody>
-          <a:bodyPr rtlCol="0" anchor="ctr"/>
-          <a:lstStyle/>
-          <a:p>
-            <a:pPr algn="ctr"/>
-            <a:r>
-              <a:rPr lang="en-US" dirty="0" smtClean="0"/>
-              <a:t>OK</a:t>
-            </a:r>
-            <a:endParaRPr lang="en-US" dirty="0"/>
-          </a:p>
-        </p:txBody>
-      </p:sp>
-      <p:sp>
-        <p:nvSpPr>
-          <p:cNvPr id="18" name="TextBox 17"/>
-          <p:cNvSpPr txBox="1"/>
-          <p:nvPr/>
-        </p:nvSpPr>
-        <p:spPr>
-          <a:xfrm>
-            <a:off x="776912" y="73743"/>
-            <a:ext cx="6964893" cy="1077218"/>
-          </a:xfrm>
-          <a:prstGeom prst="rect">
-            <a:avLst/>
-          </a:prstGeom>
-          <a:noFill/>
-        </p:spPr>
-        <p:txBody>
-          <a:bodyPr wrap="square" rtlCol="0">
-            <a:spAutoFit/>
-          </a:bodyPr>
-          <a:lstStyle/>
-          <a:p>
-            <a:r>
-              <a:rPr lang="en-US" sz="3200" dirty="0" smtClean="0"/>
-              <a:t>2. </a:t>
-            </a:r>
-            <a:r>
-              <a:rPr lang="en-US" sz="3200" dirty="0" smtClean="0"/>
-              <a:t>Inform user of captured names</a:t>
-            </a:r>
-          </a:p>
-          <a:p>
-            <a:r>
-              <a:rPr lang="en-US" sz="3200" dirty="0" smtClean="0"/>
-              <a:t>Priority </a:t>
-            </a:r>
-            <a:r>
-              <a:rPr lang="en-US" sz="3200" dirty="0" smtClean="0"/>
-              <a:t>= medium</a:t>
-            </a:r>
-            <a:endParaRPr lang="en-US" sz="3200" dirty="0"/>
+              <a:rPr lang="en-US" sz="1050" dirty="0" smtClean="0">
+                <a:solidFill>
+                  <a:schemeClr val="bg1"/>
+                </a:solidFill>
+                <a:latin typeface="Helvetica"/>
+                <a:cs typeface="Helvetica"/>
+              </a:rPr>
+              <a:t>View </a:t>
+            </a:r>
+            <a:r>
+              <a:rPr lang="en-US" sz="1050" dirty="0" smtClean="0">
+                <a:solidFill>
+                  <a:schemeClr val="bg1"/>
+                </a:solidFill>
+                <a:latin typeface="Helvetica"/>
+                <a:cs typeface="Helvetica"/>
+              </a:rPr>
+              <a:t>list</a:t>
+            </a:r>
+            <a:endParaRPr lang="en-US" sz="1050" dirty="0">
+              <a:solidFill>
+                <a:schemeClr val="bg1"/>
+              </a:solidFill>
+              <a:latin typeface="Helvetica"/>
+              <a:cs typeface="Helvetica"/>
+            </a:endParaRPr>
           </a:p>
         </p:txBody>
       </p:sp>
@@ -6487,7 +6282,7 @@
         </p:blipFill>
         <p:spPr>
           <a:xfrm>
-            <a:off x="1069270" y="1425068"/>
+            <a:off x="928163" y="1407251"/>
             <a:ext cx="2605268" cy="4623976"/>
           </a:xfrm>
           <a:prstGeom prst="rect">
@@ -6497,58 +6292,14 @@
       </p:pic>
       <p:sp>
         <p:nvSpPr>
-          <p:cNvPr id="18" name="TextBox 17"/>
+          <p:cNvPr id="12" name="TextBox 11"/>
           <p:cNvSpPr txBox="1"/>
           <p:nvPr/>
         </p:nvSpPr>
         <p:spPr>
           <a:xfrm>
-            <a:off x="466567" y="277302"/>
-            <a:ext cx="6768800" cy="1077218"/>
-          </a:xfrm>
-          <a:prstGeom prst="rect">
-            <a:avLst/>
-          </a:prstGeom>
-          <a:noFill/>
-        </p:spPr>
-        <p:txBody>
-          <a:bodyPr wrap="none" rtlCol="0">
-            <a:spAutoFit/>
-          </a:bodyPr>
-          <a:lstStyle/>
-          <a:p>
-            <a:r>
-              <a:rPr lang="en-US" sz="3200" dirty="0" smtClean="0"/>
-              <a:t>3. </a:t>
-            </a:r>
-            <a:r>
-              <a:rPr lang="en-US" sz="3200" dirty="0" smtClean="0"/>
-              <a:t>Clarify expected flow in Capture view</a:t>
-            </a:r>
-          </a:p>
-          <a:p>
-            <a:r>
-              <a:rPr lang="en-US" sz="3200" dirty="0" smtClean="0"/>
-              <a:t>Priority </a:t>
-            </a:r>
-            <a:r>
-              <a:rPr lang="en-US" sz="3200" dirty="0" smtClean="0"/>
-              <a:t>= medium</a:t>
-            </a:r>
-            <a:endParaRPr lang="en-US" sz="3200" dirty="0"/>
-          </a:p>
-        </p:txBody>
-      </p:sp>
-      <p:sp>
-        <p:nvSpPr>
-          <p:cNvPr id="19" name="TextBox 18"/>
-          <p:cNvSpPr txBox="1"/>
-          <p:nvPr/>
-        </p:nvSpPr>
-        <p:spPr>
-          <a:xfrm>
-            <a:off x="5293360" y="3550312"/>
-            <a:ext cx="3302000" cy="2031325"/>
+            <a:off x="5209327" y="760920"/>
+            <a:ext cx="3453807" cy="646331"/>
           </a:xfrm>
           <a:prstGeom prst="rect">
             <a:avLst/>
@@ -6576,85 +6327,123 @@
           <a:p>
             <a:r>
               <a:rPr lang="en-US" dirty="0" smtClean="0"/>
-              <a:t>Don’t allow </a:t>
-            </a:r>
-            <a:r>
-              <a:rPr lang="en-US" dirty="0" smtClean="0"/>
-              <a:t>cancel, just “OK” (see previous slide).  </a:t>
-            </a:r>
-            <a:r>
-              <a:rPr lang="en-US" dirty="0" smtClean="0"/>
-              <a:t>The usual workflow is to repeat the capture step.  When done, the user will choose “Go to list” to see the results.  See the next slide for the capture message. </a:t>
-            </a:r>
-            <a:endParaRPr lang="en-US" dirty="0"/>
-          </a:p>
-        </p:txBody>
-      </p:sp>
-      <p:cxnSp>
-        <p:nvCxnSpPr>
-          <p:cNvPr id="21" name="Straight Arrow Connector 20"/>
-          <p:cNvCxnSpPr>
-            <a:stCxn id="19" idx="1"/>
-          </p:cNvCxnSpPr>
-          <p:nvPr/>
-        </p:nvCxnSpPr>
-        <p:spPr>
-          <a:xfrm rot="10800000">
-            <a:off x="2184400" y="4262771"/>
-            <a:ext cx="3108960" cy="303204"/>
-          </a:xfrm>
-          <a:prstGeom prst="straightConnector1">
-            <a:avLst/>
-          </a:prstGeom>
-          <a:ln>
-            <a:tailEnd type="arrow"/>
-          </a:ln>
+              <a:t>Use alert box to tell the user what was added to the list. </a:t>
+            </a:r>
+          </a:p>
+        </p:txBody>
+      </p:sp>
+      <p:sp>
+        <p:nvSpPr>
+          <p:cNvPr id="2" name="Rectangle 1"/>
+          <p:cNvSpPr/>
+          <p:nvPr/>
+        </p:nvSpPr>
+        <p:spPr>
+          <a:xfrm>
+            <a:off x="4619450" y="2189890"/>
+            <a:ext cx="1981142" cy="1613522"/>
+          </a:xfrm>
+          <a:prstGeom prst="rect">
+            <a:avLst/>
+          </a:prstGeom>
         </p:spPr>
         <p:style>
           <a:lnRef idx="2">
-            <a:schemeClr val="accent1"/>
+            <a:schemeClr val="dk1"/>
           </a:lnRef>
-          <a:fillRef idx="0">
-            <a:schemeClr val="accent1"/>
+          <a:fillRef idx="1">
+            <a:schemeClr val="lt1"/>
           </a:fillRef>
-          <a:effectRef idx="1">
-            <a:schemeClr val="accent1"/>
-          </a:effectRef>
-          <a:fontRef idx="minor">
-            <a:schemeClr val="tx1"/>
-          </a:fontRef>
-        </p:style>
-      </p:cxnSp>
-      <p:sp>
-        <p:nvSpPr>
-          <p:cNvPr id="23" name="TextBox 22"/>
-          <p:cNvSpPr txBox="1"/>
-          <p:nvPr/>
-        </p:nvSpPr>
-        <p:spPr>
-          <a:xfrm>
-            <a:off x="5896509" y="1702422"/>
-            <a:ext cx="2042160" cy="923330"/>
-          </a:xfrm>
-          <a:prstGeom prst="rect">
-            <a:avLst/>
-          </a:prstGeom>
-        </p:spPr>
-        <p:style>
-          <a:lnRef idx="1">
-            <a:schemeClr val="accent1"/>
-          </a:lnRef>
-          <a:fillRef idx="2">
-            <a:schemeClr val="accent1"/>
-          </a:fillRef>
-          <a:effectRef idx="1">
-            <a:schemeClr val="accent1"/>
+          <a:effectRef idx="0">
+            <a:schemeClr val="dk1"/>
           </a:effectRef>
           <a:fontRef idx="minor">
             <a:schemeClr val="dk1"/>
           </a:fontRef>
         </p:style>
         <p:txBody>
+          <a:bodyPr rtlCol="0" anchor="t" anchorCtr="0"/>
+          <a:lstStyle/>
+          <a:p>
+            <a:pPr algn="ctr"/>
+            <a:r>
+              <a:rPr lang="en-US" dirty="0" smtClean="0"/>
+              <a:t>Success!</a:t>
+            </a:r>
+          </a:p>
+          <a:p>
+            <a:pPr algn="ctr"/>
+            <a:endParaRPr lang="en-US" sz="900" dirty="0" smtClean="0"/>
+          </a:p>
+          <a:p>
+            <a:pPr algn="ctr"/>
+            <a:r>
+              <a:rPr lang="en-US" sz="1400" dirty="0" smtClean="0"/>
+              <a:t>Names added: </a:t>
+            </a:r>
+            <a:r>
+              <a:rPr lang="en-US" sz="1400" dirty="0" err="1" smtClean="0"/>
+              <a:t>Lophodytes</a:t>
+            </a:r>
+            <a:r>
+              <a:rPr lang="en-US" sz="1400" dirty="0" smtClean="0"/>
+              <a:t> </a:t>
+            </a:r>
+            <a:r>
+              <a:rPr lang="en-US" sz="1400" dirty="0" err="1" smtClean="0"/>
+              <a:t>cucullatus</a:t>
+            </a:r>
+            <a:endParaRPr lang="en-US" sz="1400" dirty="0"/>
+          </a:p>
+        </p:txBody>
+      </p:sp>
+      <p:sp>
+        <p:nvSpPr>
+          <p:cNvPr id="3" name="TextBox 2"/>
+          <p:cNvSpPr txBox="1"/>
+          <p:nvPr/>
+        </p:nvSpPr>
+        <p:spPr>
+          <a:xfrm>
+            <a:off x="4259359" y="1820559"/>
+            <a:ext cx="884940" cy="369332"/>
+          </a:xfrm>
+          <a:prstGeom prst="rect">
+            <a:avLst/>
+          </a:prstGeom>
+          <a:noFill/>
+        </p:spPr>
+        <p:txBody>
+          <a:bodyPr wrap="none" rtlCol="0">
+            <a:spAutoFit/>
+          </a:bodyPr>
+          <a:lstStyle/>
+          <a:p>
+            <a:r>
+              <a:rPr lang="en-US" dirty="0" smtClean="0"/>
+              <a:t>1 name</a:t>
+            </a:r>
+            <a:endParaRPr lang="en-US" dirty="0"/>
+          </a:p>
+        </p:txBody>
+      </p:sp>
+      <p:sp>
+        <p:nvSpPr>
+          <p:cNvPr id="8" name="TextBox 7"/>
+          <p:cNvSpPr txBox="1"/>
+          <p:nvPr/>
+        </p:nvSpPr>
+        <p:spPr>
+          <a:xfrm>
+            <a:off x="4259359" y="4640465"/>
+            <a:ext cx="1227042" cy="923330"/>
+          </a:xfrm>
+          <a:prstGeom prst="rect">
+            <a:avLst/>
+          </a:prstGeom>
+          <a:noFill/>
+        </p:spPr>
+        <p:txBody>
           <a:bodyPr wrap="square" rtlCol="0">
             <a:spAutoFit/>
           </a:bodyPr>
@@ -6662,57 +6451,193 @@
           <a:p>
             <a:r>
               <a:rPr lang="en-US" dirty="0" smtClean="0"/>
-              <a:t>Replace “Species names” with “Go to list”</a:t>
+              <a:t>&gt; 1 names:</a:t>
+            </a:r>
+          </a:p>
+          <a:p>
+            <a:r>
+              <a:rPr lang="en-US" dirty="0" smtClean="0"/>
+              <a:t>Tell user how many</a:t>
             </a:r>
             <a:endParaRPr lang="en-US" dirty="0"/>
           </a:p>
         </p:txBody>
       </p:sp>
-      <p:cxnSp>
-        <p:nvCxnSpPr>
-          <p:cNvPr id="24" name="Straight Arrow Connector 23"/>
-          <p:cNvCxnSpPr>
-            <a:stCxn id="23" idx="1"/>
-          </p:cNvCxnSpPr>
-          <p:nvPr/>
-        </p:nvCxnSpPr>
-        <p:spPr>
-          <a:xfrm rot="10800000">
-            <a:off x="3555671" y="2017387"/>
-            <a:ext cx="2340839" cy="146701"/>
-          </a:xfrm>
-          <a:prstGeom prst="straightConnector1">
-            <a:avLst/>
-          </a:prstGeom>
-          <a:ln>
-            <a:tailEnd type="arrow"/>
-          </a:ln>
+      <p:sp>
+        <p:nvSpPr>
+          <p:cNvPr id="4" name="Rounded Rectangle 3"/>
+          <p:cNvSpPr/>
+          <p:nvPr/>
+        </p:nvSpPr>
+        <p:spPr>
+          <a:xfrm>
+            <a:off x="5015297" y="3305572"/>
+            <a:ext cx="1011474" cy="325903"/>
+          </a:xfrm>
+          <a:prstGeom prst="roundRect">
+            <a:avLst/>
+          </a:prstGeom>
         </p:spPr>
         <p:style>
           <a:lnRef idx="2">
-            <a:schemeClr val="accent1"/>
+            <a:schemeClr val="accent1">
+              <a:shade val="50000"/>
+            </a:schemeClr>
           </a:lnRef>
-          <a:fillRef idx="0">
+          <a:fillRef idx="1">
             <a:schemeClr val="accent1"/>
           </a:fillRef>
-          <a:effectRef idx="1">
+          <a:effectRef idx="0">
             <a:schemeClr val="accent1"/>
           </a:effectRef>
           <a:fontRef idx="minor">
-            <a:schemeClr val="tx1"/>
+            <a:schemeClr val="lt1"/>
           </a:fontRef>
         </p:style>
-      </p:cxnSp>
-      <p:sp>
-        <p:nvSpPr>
-          <p:cNvPr id="27" name="TextBox 26"/>
+        <p:txBody>
+          <a:bodyPr rtlCol="0" anchor="ctr"/>
+          <a:lstStyle/>
+          <a:p>
+            <a:pPr algn="ctr"/>
+            <a:r>
+              <a:rPr lang="en-US" dirty="0" smtClean="0"/>
+              <a:t>OK</a:t>
+            </a:r>
+            <a:endParaRPr lang="en-US" dirty="0"/>
+          </a:p>
+        </p:txBody>
+      </p:sp>
+      <p:sp>
+        <p:nvSpPr>
+          <p:cNvPr id="14" name="Rectangle 13"/>
+          <p:cNvSpPr/>
+          <p:nvPr/>
+        </p:nvSpPr>
+        <p:spPr>
+          <a:xfrm>
+            <a:off x="5627381" y="4429637"/>
+            <a:ext cx="1981142" cy="1859403"/>
+          </a:xfrm>
+          <a:prstGeom prst="rect">
+            <a:avLst/>
+          </a:prstGeom>
+        </p:spPr>
+        <p:style>
+          <a:lnRef idx="2">
+            <a:schemeClr val="dk1"/>
+          </a:lnRef>
+          <a:fillRef idx="1">
+            <a:schemeClr val="lt1"/>
+          </a:fillRef>
+          <a:effectRef idx="0">
+            <a:schemeClr val="dk1"/>
+          </a:effectRef>
+          <a:fontRef idx="minor">
+            <a:schemeClr val="dk1"/>
+          </a:fontRef>
+        </p:style>
+        <p:txBody>
+          <a:bodyPr rtlCol="0" anchor="t" anchorCtr="0"/>
+          <a:lstStyle/>
+          <a:p>
+            <a:pPr algn="ctr"/>
+            <a:r>
+              <a:rPr lang="en-US" dirty="0" smtClean="0"/>
+              <a:t>Success!</a:t>
+            </a:r>
+          </a:p>
+          <a:p>
+            <a:pPr algn="ctr"/>
+            <a:endParaRPr lang="en-US" sz="900" dirty="0" smtClean="0"/>
+          </a:p>
+          <a:p>
+            <a:pPr algn="ctr"/>
+            <a:r>
+              <a:rPr lang="en-US" sz="1400" dirty="0" smtClean="0"/>
+              <a:t>Names added: </a:t>
+            </a:r>
+            <a:r>
+              <a:rPr lang="en-US" sz="1400" dirty="0" err="1" smtClean="0"/>
+              <a:t>Lophodytes</a:t>
+            </a:r>
+            <a:r>
+              <a:rPr lang="en-US" sz="1400" dirty="0" smtClean="0"/>
+              <a:t> </a:t>
+            </a:r>
+            <a:r>
+              <a:rPr lang="en-US" sz="1400" dirty="0" err="1" smtClean="0"/>
+              <a:t>cucullatus</a:t>
+            </a:r>
+            <a:r>
+              <a:rPr lang="en-US" sz="1400" dirty="0" smtClean="0"/>
+              <a:t> and </a:t>
+            </a:r>
+            <a:r>
+              <a:rPr lang="en-US" b="1" dirty="0" smtClean="0"/>
+              <a:t>X </a:t>
+            </a:r>
+            <a:r>
+              <a:rPr lang="en-US" sz="1400" dirty="0" smtClean="0"/>
+              <a:t>others</a:t>
+            </a:r>
+            <a:endParaRPr lang="en-US" sz="1400" dirty="0"/>
+          </a:p>
+        </p:txBody>
+      </p:sp>
+      <p:sp>
+        <p:nvSpPr>
+          <p:cNvPr id="15" name="Rounded Rectangle 14"/>
+          <p:cNvSpPr/>
+          <p:nvPr/>
+        </p:nvSpPr>
+        <p:spPr>
+          <a:xfrm>
+            <a:off x="6079277" y="5773434"/>
+            <a:ext cx="1011474" cy="325903"/>
+          </a:xfrm>
+          <a:prstGeom prst="roundRect">
+            <a:avLst/>
+          </a:prstGeom>
+        </p:spPr>
+        <p:style>
+          <a:lnRef idx="2">
+            <a:schemeClr val="accent1">
+              <a:shade val="50000"/>
+            </a:schemeClr>
+          </a:lnRef>
+          <a:fillRef idx="1">
+            <a:schemeClr val="accent1"/>
+          </a:fillRef>
+          <a:effectRef idx="0">
+            <a:schemeClr val="accent1"/>
+          </a:effectRef>
+          <a:fontRef idx="minor">
+            <a:schemeClr val="lt1"/>
+          </a:fontRef>
+        </p:style>
+        <p:txBody>
+          <a:bodyPr rtlCol="0" anchor="ctr"/>
+          <a:lstStyle/>
+          <a:p>
+            <a:pPr algn="ctr"/>
+            <a:r>
+              <a:rPr lang="en-US" dirty="0" smtClean="0"/>
+              <a:t>OK</a:t>
+            </a:r>
+            <a:endParaRPr lang="en-US" dirty="0"/>
+          </a:p>
+        </p:txBody>
+      </p:sp>
+      <p:sp>
+        <p:nvSpPr>
+          <p:cNvPr id="18" name="TextBox 17"/>
           <p:cNvSpPr txBox="1"/>
           <p:nvPr/>
         </p:nvSpPr>
         <p:spPr>
           <a:xfrm>
-            <a:off x="2787549" y="1786552"/>
-            <a:ext cx="768115" cy="253916"/>
+            <a:off x="776912" y="73743"/>
+            <a:ext cx="6964893" cy="1077218"/>
           </a:xfrm>
           <a:prstGeom prst="rect">
             <a:avLst/>
@@ -6720,28 +6645,30 @@
           <a:noFill/>
         </p:spPr>
         <p:txBody>
-          <a:bodyPr wrap="none" rtlCol="0">
+          <a:bodyPr wrap="square" rtlCol="0">
             <a:spAutoFit/>
           </a:bodyPr>
           <a:lstStyle/>
           <a:p>
             <a:r>
-              <a:rPr lang="en-US" sz="1050" b="1" dirty="0" smtClean="0">
-                <a:solidFill>
-                  <a:schemeClr val="bg1"/>
-                </a:solidFill>
-                <a:latin typeface="Helvetica"/>
-                <a:cs typeface="Helvetica"/>
-              </a:rPr>
-              <a:t>Go to list</a:t>
-            </a:r>
-            <a:endParaRPr lang="en-US" sz="1050" b="1" dirty="0">
-              <a:solidFill>
-                <a:schemeClr val="bg1"/>
-              </a:solidFill>
-              <a:latin typeface="Helvetica"/>
-              <a:cs typeface="Helvetica"/>
-            </a:endParaRPr>
+              <a:rPr lang="en-US" sz="3200" dirty="0" smtClean="0"/>
+              <a:t>3</a:t>
+            </a:r>
+            <a:r>
+              <a:rPr lang="en-US" sz="3200" dirty="0" smtClean="0"/>
+              <a:t>. </a:t>
+            </a:r>
+            <a:r>
+              <a:rPr lang="en-US" sz="3200" dirty="0" smtClean="0"/>
+              <a:t>Inform user of captured names</a:t>
+            </a:r>
+          </a:p>
+          <a:p>
+            <a:r>
+              <a:rPr lang="en-US" sz="3200" dirty="0" smtClean="0"/>
+              <a:t>Priority = medium</a:t>
+            </a:r>
+            <a:endParaRPr lang="en-US" sz="3200" dirty="0"/>
           </a:p>
         </p:txBody>
       </p:sp>
@@ -6816,7 +6743,6 @@
               <a:rPr lang="en-US" dirty="0" smtClean="0"/>
               <a:t>Suggestions</a:t>
             </a:r>
-            <a:endParaRPr lang="en-US" dirty="0" smtClean="0"/>
           </a:p>
           <a:p>
             <a:pPr>
@@ -6825,27 +6751,11 @@
             </a:pPr>
             <a:r>
               <a:rPr lang="en-US" dirty="0" smtClean="0"/>
-              <a:t> alert text</a:t>
-            </a:r>
-            <a:r>
-              <a:rPr lang="en-US" dirty="0" smtClean="0"/>
-              <a:t>: </a:t>
-            </a:r>
-            <a:r>
-              <a:rPr lang="en-US" dirty="0" smtClean="0"/>
-              <a:t>“</a:t>
+              <a:t> alert text: “</a:t>
             </a:r>
             <a:r>
               <a:rPr lang="en-US" sz="2000" dirty="0" smtClean="0"/>
-              <a:t>Please s</a:t>
-            </a:r>
-            <a:r>
-              <a:rPr lang="en-US" sz="2000" dirty="0" smtClean="0"/>
-              <a:t>elect </a:t>
-            </a:r>
-            <a:r>
-              <a:rPr lang="en-US" sz="2000" dirty="0" smtClean="0"/>
-              <a:t>a list first, before trying to capture names</a:t>
+              <a:t>Please select a list first, before trying to capture names</a:t>
             </a:r>
             <a:r>
               <a:rPr lang="en-US" dirty="0" smtClean="0"/>
@@ -6859,13 +6769,8 @@
             </a:pPr>
             <a:r>
               <a:rPr lang="en-US" dirty="0" smtClean="0"/>
-              <a:t> alert title: </a:t>
-            </a:r>
-            <a:r>
-              <a:rPr lang="en-US" dirty="0" smtClean="0"/>
-              <a:t>“Oops!” </a:t>
-            </a:r>
-            <a:endParaRPr lang="en-US" dirty="0" smtClean="0"/>
+              <a:t> alert title: “Oops!” </a:t>
+            </a:r>
           </a:p>
         </p:txBody>
       </p:sp>
@@ -6918,22 +6823,14 @@
             <a:pPr algn="ctr"/>
             <a:r>
               <a:rPr lang="en-US" sz="3200" dirty="0" smtClean="0"/>
-              <a:t>4. Clarify expected </a:t>
-            </a:r>
+              <a:t>4. Clarify expected flow to user in Home view</a:t>
+            </a:r>
+          </a:p>
+          <a:p>
+            <a:pPr algn="ctr"/>
             <a:r>
               <a:rPr lang="en-US" sz="3200" dirty="0" smtClean="0"/>
-              <a:t>flow to user in Home view</a:t>
-            </a:r>
-          </a:p>
-          <a:p>
-            <a:pPr algn="ctr"/>
-            <a:r>
-              <a:rPr lang="en-US" sz="3200" dirty="0" smtClean="0"/>
-              <a:t>Priority </a:t>
-            </a:r>
-            <a:r>
-              <a:rPr lang="en-US" sz="3200" dirty="0" smtClean="0"/>
-              <a:t>= medium</a:t>
+              <a:t>Priority = medium</a:t>
             </a:r>
             <a:endParaRPr lang="en-US" sz="3200" dirty="0"/>
           </a:p>
@@ -6996,22 +6893,14 @@
             <a:pPr algn="ctr"/>
             <a:r>
               <a:rPr lang="en-US" sz="3200" dirty="0" smtClean="0"/>
-              <a:t>5. </a:t>
-            </a:r>
+              <a:t>5. De-clutter tree view</a:t>
+            </a:r>
+          </a:p>
+          <a:p>
+            <a:pPr algn="ctr"/>
             <a:r>
               <a:rPr lang="en-US" sz="3200" dirty="0" smtClean="0"/>
-              <a:t>De-clutter tree view</a:t>
-            </a:r>
-          </a:p>
-          <a:p>
-            <a:pPr algn="ctr"/>
-            <a:r>
-              <a:rPr lang="en-US" sz="3200" dirty="0" smtClean="0"/>
-              <a:t>Priority </a:t>
-            </a:r>
-            <a:r>
-              <a:rPr lang="en-US" sz="3200" dirty="0" smtClean="0"/>
-              <a:t>= medium</a:t>
+              <a:t>Priority = medium</a:t>
             </a:r>
             <a:endParaRPr lang="en-US" sz="3200" dirty="0"/>
           </a:p>
@@ -7345,22 +7234,14 @@
             </a:pPr>
             <a:r>
               <a:rPr lang="en-US" sz="3200" dirty="0" smtClean="0"/>
-              <a:t>Add help button to </a:t>
-            </a:r>
+              <a:t>Add help button to every view</a:t>
+            </a:r>
+          </a:p>
+          <a:p>
+            <a:pPr marL="514350" indent="-514350" algn="ctr"/>
             <a:r>
               <a:rPr lang="en-US" sz="3200" dirty="0" smtClean="0"/>
-              <a:t>every view</a:t>
-            </a:r>
-          </a:p>
-          <a:p>
-            <a:pPr marL="514350" indent="-514350" algn="ctr"/>
-            <a:r>
-              <a:rPr lang="en-US" sz="3200" dirty="0" smtClean="0"/>
-              <a:t>Priority </a:t>
-            </a:r>
-            <a:r>
-              <a:rPr lang="en-US" sz="3200" dirty="0" smtClean="0"/>
-              <a:t>= medium</a:t>
+              <a:t>Priority = medium</a:t>
             </a:r>
             <a:endParaRPr lang="en-US" sz="3200" dirty="0"/>
           </a:p>
@@ -7677,23 +7558,15 @@
           <a:p>
             <a:r>
               <a:rPr lang="en-US" dirty="0" smtClean="0"/>
-              <a:t>3. Text under icons, not to the side. Most </a:t>
+              <a:t>3. </a:t>
+            </a:r>
+            <a:r>
+              <a:rPr lang="en-US" b="1" dirty="0" smtClean="0"/>
+              <a:t>Text under icons, not to the side</a:t>
             </a:r>
             <a:r>
               <a:rPr lang="en-US" dirty="0" smtClean="0"/>
-              <a:t>apps use</a:t>
-            </a:r>
-            <a:r>
-              <a:rPr lang="en-US" dirty="0" smtClean="0"/>
-              <a:t> 8 </a:t>
-            </a:r>
-            <a:r>
-              <a:rPr lang="en-US" dirty="0" smtClean="0"/>
-              <a:t>or 9 pt </a:t>
-            </a:r>
-            <a:r>
-              <a:rPr lang="en-US" dirty="0" smtClean="0"/>
-              <a:t>text</a:t>
+              <a:t>. Most apps use 8 or 9 pt text</a:t>
             </a:r>
             <a:endParaRPr lang="en-US" dirty="0"/>
           </a:p>
@@ -7780,19 +7653,7 @@
             </a:r>
             <a:r>
               <a:rPr lang="en-US" sz="1600" dirty="0" smtClean="0"/>
-              <a:t> (or </a:t>
-            </a:r>
-            <a:r>
-              <a:rPr lang="en-US" sz="1600" dirty="0" smtClean="0"/>
-              <a:t>add an alert that says “Sorry, this feature is not yet implemented!</a:t>
-            </a:r>
-            <a:r>
-              <a:rPr lang="en-US" sz="1600" dirty="0" smtClean="0"/>
-              <a:t>”</a:t>
-            </a:r>
-            <a:r>
-              <a:rPr lang="en-US" sz="1600" dirty="0" smtClean="0"/>
-              <a:t>)</a:t>
+              <a:t> (or add an alert that says “Sorry, this feature is not yet implemented!”)</a:t>
             </a:r>
             <a:endParaRPr lang="en-US" sz="1600" dirty="0"/>
           </a:p>
@@ -7807,7 +7668,7 @@
         <p:spPr>
           <a:xfrm>
             <a:off x="5705596" y="823333"/>
-            <a:ext cx="2800767" cy="1200329"/>
+            <a:ext cx="2800767" cy="923330"/>
           </a:xfrm>
           <a:prstGeom prst="rect">
             <a:avLst/>
@@ -7839,15 +7700,19 @@
             </a:r>
             <a:r>
               <a:rPr lang="en-US" b="1" dirty="0" smtClean="0"/>
-              <a:t>Use </a:t>
-            </a:r>
-            <a:r>
-              <a:rPr lang="en-US" b="1" dirty="0" smtClean="0"/>
-              <a:t>logo. </a:t>
+              <a:t>Use logo. </a:t>
             </a:r>
             <a:r>
               <a:rPr lang="en-US" dirty="0" smtClean="0"/>
-              <a:t> Change top strip background color to grey so that logo is fully visible.  </a:t>
+              <a:t> Change top strip background color</a:t>
+            </a:r>
+            <a:r>
+              <a:rPr lang="en-US" dirty="0" smtClean="0"/>
+              <a:t> so </a:t>
+            </a:r>
+            <a:r>
+              <a:rPr lang="en-US" dirty="0" smtClean="0"/>
+              <a:t>that logo is fully visible.  </a:t>
             </a:r>
             <a:endParaRPr lang="en-US" dirty="0"/>
           </a:p>
@@ -7885,11 +7750,7 @@
             <a:pPr algn="ctr"/>
             <a:r>
               <a:rPr lang="en-US" sz="3200" dirty="0" smtClean="0"/>
-              <a:t>Priority </a:t>
-            </a:r>
-            <a:r>
-              <a:rPr lang="en-US" sz="3200" dirty="0" smtClean="0"/>
-              <a:t>= medium</a:t>
+              <a:t>Priority = medium</a:t>
             </a:r>
             <a:endParaRPr lang="en-US" sz="3200" dirty="0"/>
           </a:p>
@@ -7910,10 +7771,7 @@
             <a:avLst/>
           </a:prstGeom>
           <a:solidFill>
-            <a:schemeClr val="tx1">
-              <a:lumMod val="50000"/>
-              <a:lumOff val="50000"/>
-            </a:schemeClr>
+            <a:srgbClr val="2056FF"/>
           </a:solidFill>
         </p:spPr>
         <p:style>
@@ -8170,7 +8028,7 @@
             <a:avLst/>
           </a:prstGeom>
           <a:solidFill>
-            <a:srgbClr val="595959"/>
+            <a:srgbClr val="2056FF"/>
           </a:solidFill>
         </p:spPr>
         <p:style>

</xml_diff>